<commit_message>
adding demo for mongo db data load and display content on ui
</commit_message>
<xml_diff>
--- a/presentation/travelenzy.pptx
+++ b/presentation/travelenzy.pptx
@@ -6,7 +6,17 @@
   </p:sldMasterIdLst>
   <p:sldIdLst>
     <p:sldId id="256" r:id="rId2"/>
-    <p:sldId id="257" r:id="rId3"/>
+    <p:sldId id="267" r:id="rId3"/>
+    <p:sldId id="258" r:id="rId4"/>
+    <p:sldId id="259" r:id="rId5"/>
+    <p:sldId id="257" r:id="rId6"/>
+    <p:sldId id="261" r:id="rId7"/>
+    <p:sldId id="266" r:id="rId8"/>
+    <p:sldId id="260" r:id="rId9"/>
+    <p:sldId id="262" r:id="rId10"/>
+    <p:sldId id="263" r:id="rId11"/>
+    <p:sldId id="264" r:id="rId12"/>
+    <p:sldId id="265" r:id="rId13"/>
   </p:sldIdLst>
   <p:sldSz cx="12192000" cy="6858000"/>
   <p:notesSz cx="6858000" cy="9144000"/>
@@ -105,6 +115,11 @@
       </a:defRPr>
     </a:lvl9pPr>
   </p:defaultTextStyle>
+  <p:extLst>
+    <p:ext uri="{EFAFB233-063F-42B5-8137-9DF3F51BA10A}">
+      <p15:sldGuideLst xmlns:p15="http://schemas.microsoft.com/office/powerpoint/2012/main"/>
+    </p:ext>
+  </p:extLst>
 </p:presentation>
 </file>
 
@@ -255,7 +270,7 @@
           <a:p>
             <a:fld id="{15F68CBF-D64B-594A-90C1-F826E73A0BE9}" type="datetimeFigureOut">
               <a:rPr lang="en-US" smtClean="0"/>
-              <a:t>7/16/19</a:t>
+              <a:t>8/5/19</a:t>
             </a:fld>
             <a:endParaRPr lang="en-US"/>
           </a:p>
@@ -453,7 +468,7 @@
           <a:p>
             <a:fld id="{15F68CBF-D64B-594A-90C1-F826E73A0BE9}" type="datetimeFigureOut">
               <a:rPr lang="en-US" smtClean="0"/>
-              <a:t>7/16/19</a:t>
+              <a:t>8/5/19</a:t>
             </a:fld>
             <a:endParaRPr lang="en-US"/>
           </a:p>
@@ -661,7 +676,7 @@
           <a:p>
             <a:fld id="{15F68CBF-D64B-594A-90C1-F826E73A0BE9}" type="datetimeFigureOut">
               <a:rPr lang="en-US" smtClean="0"/>
-              <a:t>7/16/19</a:t>
+              <a:t>8/5/19</a:t>
             </a:fld>
             <a:endParaRPr lang="en-US"/>
           </a:p>
@@ -859,7 +874,7 @@
           <a:p>
             <a:fld id="{15F68CBF-D64B-594A-90C1-F826E73A0BE9}" type="datetimeFigureOut">
               <a:rPr lang="en-US" smtClean="0"/>
-              <a:t>7/16/19</a:t>
+              <a:t>8/5/19</a:t>
             </a:fld>
             <a:endParaRPr lang="en-US"/>
           </a:p>
@@ -1134,7 +1149,7 @@
           <a:p>
             <a:fld id="{15F68CBF-D64B-594A-90C1-F826E73A0BE9}" type="datetimeFigureOut">
               <a:rPr lang="en-US" smtClean="0"/>
-              <a:t>7/16/19</a:t>
+              <a:t>8/5/19</a:t>
             </a:fld>
             <a:endParaRPr lang="en-US"/>
           </a:p>
@@ -1399,7 +1414,7 @@
           <a:p>
             <a:fld id="{15F68CBF-D64B-594A-90C1-F826E73A0BE9}" type="datetimeFigureOut">
               <a:rPr lang="en-US" smtClean="0"/>
-              <a:t>7/16/19</a:t>
+              <a:t>8/5/19</a:t>
             </a:fld>
             <a:endParaRPr lang="en-US"/>
           </a:p>
@@ -1811,7 +1826,7 @@
           <a:p>
             <a:fld id="{15F68CBF-D64B-594A-90C1-F826E73A0BE9}" type="datetimeFigureOut">
               <a:rPr lang="en-US" smtClean="0"/>
-              <a:t>7/16/19</a:t>
+              <a:t>8/5/19</a:t>
             </a:fld>
             <a:endParaRPr lang="en-US"/>
           </a:p>
@@ -1952,7 +1967,7 @@
           <a:p>
             <a:fld id="{15F68CBF-D64B-594A-90C1-F826E73A0BE9}" type="datetimeFigureOut">
               <a:rPr lang="en-US" smtClean="0"/>
-              <a:t>7/16/19</a:t>
+              <a:t>8/5/19</a:t>
             </a:fld>
             <a:endParaRPr lang="en-US"/>
           </a:p>
@@ -2065,7 +2080,7 @@
           <a:p>
             <a:fld id="{15F68CBF-D64B-594A-90C1-F826E73A0BE9}" type="datetimeFigureOut">
               <a:rPr lang="en-US" smtClean="0"/>
-              <a:t>7/16/19</a:t>
+              <a:t>8/5/19</a:t>
             </a:fld>
             <a:endParaRPr lang="en-US"/>
           </a:p>
@@ -2376,7 +2391,7 @@
           <a:p>
             <a:fld id="{15F68CBF-D64B-594A-90C1-F826E73A0BE9}" type="datetimeFigureOut">
               <a:rPr lang="en-US" smtClean="0"/>
-              <a:t>7/16/19</a:t>
+              <a:t>8/5/19</a:t>
             </a:fld>
             <a:endParaRPr lang="en-US"/>
           </a:p>
@@ -2664,7 +2679,7 @@
           <a:p>
             <a:fld id="{15F68CBF-D64B-594A-90C1-F826E73A0BE9}" type="datetimeFigureOut">
               <a:rPr lang="en-US" smtClean="0"/>
-              <a:t>7/16/19</a:t>
+              <a:t>8/5/19</a:t>
             </a:fld>
             <a:endParaRPr lang="en-US"/>
           </a:p>
@@ -2905,7 +2920,7 @@
           <a:p>
             <a:fld id="{15F68CBF-D64B-594A-90C1-F826E73A0BE9}" type="datetimeFigureOut">
               <a:rPr lang="en-US" smtClean="0"/>
-              <a:t>7/16/19</a:t>
+              <a:t>8/5/19</a:t>
             </a:fld>
             <a:endParaRPr lang="en-US"/>
           </a:p>
@@ -3392,6 +3407,279 @@
 </p:sld>
 </file>
 
+<file path=ppt/slides/slide10.xml><?xml version="1.0" encoding="utf-8"?>
+<p:sld xmlns:a="http://schemas.openxmlformats.org/drawingml/2006/main" xmlns:r="http://schemas.openxmlformats.org/officeDocument/2006/relationships" xmlns:p="http://schemas.openxmlformats.org/presentationml/2006/main">
+  <p:cSld>
+    <p:spTree>
+      <p:nvGrpSpPr>
+        <p:cNvPr id="1" name=""/>
+        <p:cNvGrpSpPr/>
+        <p:nvPr/>
+      </p:nvGrpSpPr>
+      <p:grpSpPr>
+        <a:xfrm>
+          <a:off x="0" y="0"/>
+          <a:ext cx="0" cy="0"/>
+          <a:chOff x="0" y="0"/>
+          <a:chExt cx="0" cy="0"/>
+        </a:xfrm>
+      </p:grpSpPr>
+      <p:sp>
+        <p:nvSpPr>
+          <p:cNvPr id="2" name="Title 1">
+            <a:extLst>
+              <a:ext uri="{FF2B5EF4-FFF2-40B4-BE49-F238E27FC236}">
+                <a16:creationId xmlns:a16="http://schemas.microsoft.com/office/drawing/2014/main" id="{18ED81E4-2769-7B43-A3DB-8B14D96EB456}"/>
+              </a:ext>
+            </a:extLst>
+          </p:cNvPr>
+          <p:cNvSpPr>
+            <a:spLocks noGrp="1"/>
+          </p:cNvSpPr>
+          <p:nvPr>
+            <p:ph type="title"/>
+          </p:nvPr>
+        </p:nvSpPr>
+        <p:spPr/>
+        <p:txBody>
+          <a:bodyPr/>
+          <a:lstStyle/>
+          <a:p>
+            <a:r>
+              <a:rPr lang="en-US" dirty="0"/>
+              <a:t>Target users/Use cases  </a:t>
+            </a:r>
+          </a:p>
+        </p:txBody>
+      </p:sp>
+      <p:sp>
+        <p:nvSpPr>
+          <p:cNvPr id="3" name="Content Placeholder 2">
+            <a:extLst>
+              <a:ext uri="{FF2B5EF4-FFF2-40B4-BE49-F238E27FC236}">
+                <a16:creationId xmlns:a16="http://schemas.microsoft.com/office/drawing/2014/main" id="{F0A5B24F-A004-1746-8214-1574525600CC}"/>
+              </a:ext>
+            </a:extLst>
+          </p:cNvPr>
+          <p:cNvSpPr>
+            <a:spLocks noGrp="1"/>
+          </p:cNvSpPr>
+          <p:nvPr>
+            <p:ph idx="1"/>
+          </p:nvPr>
+        </p:nvSpPr>
+        <p:spPr/>
+        <p:txBody>
+          <a:bodyPr/>
+          <a:lstStyle/>
+          <a:p>
+            <a:r>
+              <a:rPr lang="en-US" dirty="0"/>
+              <a:t>Travelers </a:t>
+            </a:r>
+          </a:p>
+          <a:p>
+            <a:r>
+              <a:rPr lang="en-US" dirty="0"/>
+              <a:t>Researchers </a:t>
+            </a:r>
+          </a:p>
+        </p:txBody>
+      </p:sp>
+    </p:spTree>
+    <p:extLst>
+      <p:ext uri="{BB962C8B-B14F-4D97-AF65-F5344CB8AC3E}">
+        <p14:creationId xmlns:p14="http://schemas.microsoft.com/office/powerpoint/2010/main" val="4291896012"/>
+      </p:ext>
+    </p:extLst>
+  </p:cSld>
+  <p:clrMapOvr>
+    <a:masterClrMapping/>
+  </p:clrMapOvr>
+</p:sld>
+</file>
+
+<file path=ppt/slides/slide11.xml><?xml version="1.0" encoding="utf-8"?>
+<p:sld xmlns:a="http://schemas.openxmlformats.org/drawingml/2006/main" xmlns:r="http://schemas.openxmlformats.org/officeDocument/2006/relationships" xmlns:p="http://schemas.openxmlformats.org/presentationml/2006/main">
+  <p:cSld>
+    <p:spTree>
+      <p:nvGrpSpPr>
+        <p:cNvPr id="1" name=""/>
+        <p:cNvGrpSpPr/>
+        <p:nvPr/>
+      </p:nvGrpSpPr>
+      <p:grpSpPr>
+        <a:xfrm>
+          <a:off x="0" y="0"/>
+          <a:ext cx="0" cy="0"/>
+          <a:chOff x="0" y="0"/>
+          <a:chExt cx="0" cy="0"/>
+        </a:xfrm>
+      </p:grpSpPr>
+      <p:sp>
+        <p:nvSpPr>
+          <p:cNvPr id="2" name="Title 1">
+            <a:extLst>
+              <a:ext uri="{FF2B5EF4-FFF2-40B4-BE49-F238E27FC236}">
+                <a16:creationId xmlns:a16="http://schemas.microsoft.com/office/drawing/2014/main" id="{0BBABE2B-710E-6E48-93D3-DB7B86D1F7C2}"/>
+              </a:ext>
+            </a:extLst>
+          </p:cNvPr>
+          <p:cNvSpPr>
+            <a:spLocks noGrp="1"/>
+          </p:cNvSpPr>
+          <p:nvPr>
+            <p:ph type="title"/>
+          </p:nvPr>
+        </p:nvSpPr>
+        <p:spPr/>
+        <p:txBody>
+          <a:bodyPr/>
+          <a:lstStyle/>
+          <a:p>
+            <a:r>
+              <a:rPr lang="en-US" dirty="0"/>
+              <a:t>Future Enhancements</a:t>
+            </a:r>
+          </a:p>
+        </p:txBody>
+      </p:sp>
+      <p:sp>
+        <p:nvSpPr>
+          <p:cNvPr id="3" name="Content Placeholder 2">
+            <a:extLst>
+              <a:ext uri="{FF2B5EF4-FFF2-40B4-BE49-F238E27FC236}">
+                <a16:creationId xmlns:a16="http://schemas.microsoft.com/office/drawing/2014/main" id="{27208CE8-F6BE-8D4F-B026-A77820505E98}"/>
+              </a:ext>
+            </a:extLst>
+          </p:cNvPr>
+          <p:cNvSpPr>
+            <a:spLocks noGrp="1"/>
+          </p:cNvSpPr>
+          <p:nvPr>
+            <p:ph idx="1"/>
+          </p:nvPr>
+        </p:nvSpPr>
+        <p:spPr/>
+        <p:txBody>
+          <a:bodyPr/>
+          <a:lstStyle/>
+          <a:p>
+            <a:r>
+              <a:rPr lang="en-US" dirty="0"/>
+              <a:t>Streamed Data from Spark</a:t>
+            </a:r>
+          </a:p>
+          <a:p>
+            <a:r>
+              <a:rPr lang="en-US" dirty="0"/>
+              <a:t>Integrate user feedback and do some analytics on that </a:t>
+            </a:r>
+          </a:p>
+          <a:p>
+            <a:r>
+              <a:rPr lang="en-US" dirty="0"/>
+              <a:t>Recommendation Engine</a:t>
+            </a:r>
+          </a:p>
+        </p:txBody>
+      </p:sp>
+    </p:spTree>
+    <p:extLst>
+      <p:ext uri="{BB962C8B-B14F-4D97-AF65-F5344CB8AC3E}">
+        <p14:creationId xmlns:p14="http://schemas.microsoft.com/office/powerpoint/2010/main" val="3623047502"/>
+      </p:ext>
+    </p:extLst>
+  </p:cSld>
+  <p:clrMapOvr>
+    <a:masterClrMapping/>
+  </p:clrMapOvr>
+</p:sld>
+</file>
+
+<file path=ppt/slides/slide12.xml><?xml version="1.0" encoding="utf-8"?>
+<p:sld xmlns:a="http://schemas.openxmlformats.org/drawingml/2006/main" xmlns:r="http://schemas.openxmlformats.org/officeDocument/2006/relationships" xmlns:p="http://schemas.openxmlformats.org/presentationml/2006/main">
+  <p:cSld>
+    <p:spTree>
+      <p:nvGrpSpPr>
+        <p:cNvPr id="1" name=""/>
+        <p:cNvGrpSpPr/>
+        <p:nvPr/>
+      </p:nvGrpSpPr>
+      <p:grpSpPr>
+        <a:xfrm>
+          <a:off x="0" y="0"/>
+          <a:ext cx="0" cy="0"/>
+          <a:chOff x="0" y="0"/>
+          <a:chExt cx="0" cy="0"/>
+        </a:xfrm>
+      </p:grpSpPr>
+      <p:sp>
+        <p:nvSpPr>
+          <p:cNvPr id="2" name="Title 1">
+            <a:extLst>
+              <a:ext uri="{FF2B5EF4-FFF2-40B4-BE49-F238E27FC236}">
+                <a16:creationId xmlns:a16="http://schemas.microsoft.com/office/drawing/2014/main" id="{1517117D-EDC6-E249-A102-430954D56233}"/>
+              </a:ext>
+            </a:extLst>
+          </p:cNvPr>
+          <p:cNvSpPr>
+            <a:spLocks noGrp="1"/>
+          </p:cNvSpPr>
+          <p:nvPr>
+            <p:ph type="title"/>
+          </p:nvPr>
+        </p:nvSpPr>
+        <p:spPr/>
+        <p:txBody>
+          <a:bodyPr/>
+          <a:lstStyle/>
+          <a:p>
+            <a:r>
+              <a:rPr lang="en-US" dirty="0"/>
+              <a:t>Demo</a:t>
+            </a:r>
+          </a:p>
+        </p:txBody>
+      </p:sp>
+      <p:sp>
+        <p:nvSpPr>
+          <p:cNvPr id="3" name="Content Placeholder 2">
+            <a:extLst>
+              <a:ext uri="{FF2B5EF4-FFF2-40B4-BE49-F238E27FC236}">
+                <a16:creationId xmlns:a16="http://schemas.microsoft.com/office/drawing/2014/main" id="{43D997DB-3D84-154D-8D04-555904B90AD8}"/>
+              </a:ext>
+            </a:extLst>
+          </p:cNvPr>
+          <p:cNvSpPr>
+            <a:spLocks noGrp="1"/>
+          </p:cNvSpPr>
+          <p:nvPr>
+            <p:ph idx="1"/>
+          </p:nvPr>
+        </p:nvSpPr>
+        <p:spPr/>
+        <p:txBody>
+          <a:bodyPr/>
+          <a:lstStyle/>
+          <a:p>
+            <a:endParaRPr lang="en-US"/>
+          </a:p>
+        </p:txBody>
+      </p:sp>
+    </p:spTree>
+    <p:extLst>
+      <p:ext uri="{BB962C8B-B14F-4D97-AF65-F5344CB8AC3E}">
+        <p14:creationId xmlns:p14="http://schemas.microsoft.com/office/powerpoint/2010/main" val="3273945038"/>
+      </p:ext>
+    </p:extLst>
+  </p:cSld>
+  <p:clrMapOvr>
+    <a:masterClrMapping/>
+  </p:clrMapOvr>
+</p:sld>
+</file>
+
 <file path=ppt/slides/slide2.xml><?xml version="1.0" encoding="utf-8"?>
 <p:sld xmlns:a="http://schemas.openxmlformats.org/drawingml/2006/main" xmlns:r="http://schemas.openxmlformats.org/officeDocument/2006/relationships" xmlns:p="http://schemas.openxmlformats.org/presentationml/2006/main">
   <p:cSld>
@@ -3414,6 +3702,320 @@
           <p:cNvPr id="2" name="Title 1">
             <a:extLst>
               <a:ext uri="{FF2B5EF4-FFF2-40B4-BE49-F238E27FC236}">
+                <a16:creationId xmlns:a16="http://schemas.microsoft.com/office/drawing/2014/main" id="{961BD201-9ADF-C84D-929B-BF57A7D1493F}"/>
+              </a:ext>
+            </a:extLst>
+          </p:cNvPr>
+          <p:cNvSpPr>
+            <a:spLocks noGrp="1"/>
+          </p:cNvSpPr>
+          <p:nvPr>
+            <p:ph type="title"/>
+          </p:nvPr>
+        </p:nvSpPr>
+        <p:spPr/>
+        <p:txBody>
+          <a:bodyPr/>
+          <a:lstStyle/>
+          <a:p>
+            <a:r>
+              <a:rPr lang="en-US" dirty="0"/>
+              <a:t>Scope of Implementation </a:t>
+            </a:r>
+          </a:p>
+        </p:txBody>
+      </p:sp>
+      <p:sp>
+        <p:nvSpPr>
+          <p:cNvPr id="3" name="Content Placeholder 2">
+            <a:extLst>
+              <a:ext uri="{FF2B5EF4-FFF2-40B4-BE49-F238E27FC236}">
+                <a16:creationId xmlns:a16="http://schemas.microsoft.com/office/drawing/2014/main" id="{3406550C-0A09-6B4C-94AD-44BE317667F8}"/>
+              </a:ext>
+            </a:extLst>
+          </p:cNvPr>
+          <p:cNvSpPr>
+            <a:spLocks noGrp="1"/>
+          </p:cNvSpPr>
+          <p:nvPr>
+            <p:ph idx="1"/>
+          </p:nvPr>
+        </p:nvSpPr>
+        <p:spPr/>
+        <p:txBody>
+          <a:bodyPr/>
+          <a:lstStyle/>
+          <a:p>
+            <a:r>
+              <a:rPr lang="en-US" dirty="0"/>
+              <a:t>Functional Objectives</a:t>
+            </a:r>
+          </a:p>
+          <a:p>
+            <a:r>
+              <a:rPr lang="en-US" dirty="0"/>
+              <a:t>Technical Details </a:t>
+            </a:r>
+          </a:p>
+          <a:p>
+            <a:r>
+              <a:rPr lang="en-US" dirty="0"/>
+              <a:t>User Applications</a:t>
+            </a:r>
+          </a:p>
+          <a:p>
+            <a:r>
+              <a:rPr lang="en-US" dirty="0"/>
+              <a:t>Future Enhancements </a:t>
+            </a:r>
+          </a:p>
+          <a:p>
+            <a:r>
+              <a:rPr lang="en-US" dirty="0"/>
+              <a:t>Key Learnings </a:t>
+            </a:r>
+          </a:p>
+          <a:p>
+            <a:r>
+              <a:rPr lang="en-US" dirty="0"/>
+              <a:t>Demo</a:t>
+            </a:r>
+          </a:p>
+        </p:txBody>
+      </p:sp>
+    </p:spTree>
+    <p:extLst>
+      <p:ext uri="{BB962C8B-B14F-4D97-AF65-F5344CB8AC3E}">
+        <p14:creationId xmlns:p14="http://schemas.microsoft.com/office/powerpoint/2010/main" val="1596747380"/>
+      </p:ext>
+    </p:extLst>
+  </p:cSld>
+  <p:clrMapOvr>
+    <a:masterClrMapping/>
+  </p:clrMapOvr>
+</p:sld>
+</file>
+
+<file path=ppt/slides/slide3.xml><?xml version="1.0" encoding="utf-8"?>
+<p:sld xmlns:a="http://schemas.openxmlformats.org/drawingml/2006/main" xmlns:r="http://schemas.openxmlformats.org/officeDocument/2006/relationships" xmlns:p="http://schemas.openxmlformats.org/presentationml/2006/main">
+  <p:cSld>
+    <p:spTree>
+      <p:nvGrpSpPr>
+        <p:cNvPr id="1" name=""/>
+        <p:cNvGrpSpPr/>
+        <p:nvPr/>
+      </p:nvGrpSpPr>
+      <p:grpSpPr>
+        <a:xfrm>
+          <a:off x="0" y="0"/>
+          <a:ext cx="0" cy="0"/>
+          <a:chOff x="0" y="0"/>
+          <a:chExt cx="0" cy="0"/>
+        </a:xfrm>
+      </p:grpSpPr>
+      <p:sp>
+        <p:nvSpPr>
+          <p:cNvPr id="2" name="Title 1">
+            <a:extLst>
+              <a:ext uri="{FF2B5EF4-FFF2-40B4-BE49-F238E27FC236}">
+                <a16:creationId xmlns:a16="http://schemas.microsoft.com/office/drawing/2014/main" id="{ACFECD70-DB23-3249-B7BC-2124631AEBB6}"/>
+              </a:ext>
+            </a:extLst>
+          </p:cNvPr>
+          <p:cNvSpPr>
+            <a:spLocks noGrp="1"/>
+          </p:cNvSpPr>
+          <p:nvPr>
+            <p:ph type="title"/>
+          </p:nvPr>
+        </p:nvSpPr>
+        <p:spPr/>
+        <p:txBody>
+          <a:bodyPr/>
+          <a:lstStyle/>
+          <a:p>
+            <a:r>
+              <a:rPr lang="en-US" dirty="0"/>
+              <a:t>Functional Objectives</a:t>
+            </a:r>
+          </a:p>
+        </p:txBody>
+      </p:sp>
+      <p:sp>
+        <p:nvSpPr>
+          <p:cNvPr id="3" name="Content Placeholder 2">
+            <a:extLst>
+              <a:ext uri="{FF2B5EF4-FFF2-40B4-BE49-F238E27FC236}">
+                <a16:creationId xmlns:a16="http://schemas.microsoft.com/office/drawing/2014/main" id="{F9F8B4CC-1E46-8E4C-8DCB-40654D2453EA}"/>
+              </a:ext>
+            </a:extLst>
+          </p:cNvPr>
+          <p:cNvSpPr>
+            <a:spLocks noGrp="1"/>
+          </p:cNvSpPr>
+          <p:nvPr>
+            <p:ph idx="1"/>
+          </p:nvPr>
+        </p:nvSpPr>
+        <p:spPr/>
+        <p:txBody>
+          <a:bodyPr/>
+          <a:lstStyle/>
+          <a:p>
+            <a:r>
+              <a:rPr lang="en-US" dirty="0"/>
+              <a:t>Purpose</a:t>
+            </a:r>
+          </a:p>
+          <a:p>
+            <a:pPr lvl="1"/>
+            <a:r>
+              <a:rPr lang="en-US" dirty="0"/>
+              <a:t>To Integrate different data source and store them in common format</a:t>
+            </a:r>
+          </a:p>
+          <a:p>
+            <a:pPr lvl="1"/>
+            <a:r>
+              <a:rPr lang="en-US" dirty="0"/>
+              <a:t>Make them available in easy </a:t>
+            </a:r>
+          </a:p>
+          <a:p>
+            <a:pPr lvl="1"/>
+            <a:endParaRPr lang="en-US" dirty="0"/>
+          </a:p>
+          <a:p>
+            <a:pPr lvl="1"/>
+            <a:endParaRPr lang="en-US" dirty="0"/>
+          </a:p>
+          <a:p>
+            <a:pPr lvl="1"/>
+            <a:endParaRPr lang="en-US" dirty="0"/>
+          </a:p>
+        </p:txBody>
+      </p:sp>
+    </p:spTree>
+    <p:extLst>
+      <p:ext uri="{BB962C8B-B14F-4D97-AF65-F5344CB8AC3E}">
+        <p14:creationId xmlns:p14="http://schemas.microsoft.com/office/powerpoint/2010/main" val="350367820"/>
+      </p:ext>
+    </p:extLst>
+  </p:cSld>
+  <p:clrMapOvr>
+    <a:masterClrMapping/>
+  </p:clrMapOvr>
+</p:sld>
+</file>
+
+<file path=ppt/slides/slide4.xml><?xml version="1.0" encoding="utf-8"?>
+<p:sld xmlns:a="http://schemas.openxmlformats.org/drawingml/2006/main" xmlns:r="http://schemas.openxmlformats.org/officeDocument/2006/relationships" xmlns:p="http://schemas.openxmlformats.org/presentationml/2006/main">
+  <p:cSld>
+    <p:spTree>
+      <p:nvGrpSpPr>
+        <p:cNvPr id="1" name=""/>
+        <p:cNvGrpSpPr/>
+        <p:nvPr/>
+      </p:nvGrpSpPr>
+      <p:grpSpPr>
+        <a:xfrm>
+          <a:off x="0" y="0"/>
+          <a:ext cx="0" cy="0"/>
+          <a:chOff x="0" y="0"/>
+          <a:chExt cx="0" cy="0"/>
+        </a:xfrm>
+      </p:grpSpPr>
+      <p:sp>
+        <p:nvSpPr>
+          <p:cNvPr id="2" name="Title 1">
+            <a:extLst>
+              <a:ext uri="{FF2B5EF4-FFF2-40B4-BE49-F238E27FC236}">
+                <a16:creationId xmlns:a16="http://schemas.microsoft.com/office/drawing/2014/main" id="{929C7E00-DF06-AC4B-A7DB-78DA06774B3A}"/>
+              </a:ext>
+            </a:extLst>
+          </p:cNvPr>
+          <p:cNvSpPr>
+            <a:spLocks noGrp="1"/>
+          </p:cNvSpPr>
+          <p:nvPr>
+            <p:ph type="title"/>
+          </p:nvPr>
+        </p:nvSpPr>
+        <p:spPr/>
+        <p:txBody>
+          <a:bodyPr/>
+          <a:lstStyle/>
+          <a:p>
+            <a:r>
+              <a:rPr lang="en-US" dirty="0"/>
+              <a:t>Functional Objectives</a:t>
+            </a:r>
+          </a:p>
+        </p:txBody>
+      </p:sp>
+      <p:sp>
+        <p:nvSpPr>
+          <p:cNvPr id="3" name="Content Placeholder 2">
+            <a:extLst>
+              <a:ext uri="{FF2B5EF4-FFF2-40B4-BE49-F238E27FC236}">
+                <a16:creationId xmlns:a16="http://schemas.microsoft.com/office/drawing/2014/main" id="{062E73DB-5680-0C41-8F36-E651F9375C31}"/>
+              </a:ext>
+            </a:extLst>
+          </p:cNvPr>
+          <p:cNvSpPr>
+            <a:spLocks noGrp="1"/>
+          </p:cNvSpPr>
+          <p:nvPr>
+            <p:ph idx="1"/>
+          </p:nvPr>
+        </p:nvSpPr>
+        <p:spPr/>
+        <p:txBody>
+          <a:bodyPr/>
+          <a:lstStyle/>
+          <a:p>
+            <a:r>
+              <a:rPr lang="en-US" dirty="0"/>
+              <a:t>Challenges</a:t>
+            </a:r>
+          </a:p>
+        </p:txBody>
+      </p:sp>
+    </p:spTree>
+    <p:extLst>
+      <p:ext uri="{BB962C8B-B14F-4D97-AF65-F5344CB8AC3E}">
+        <p14:creationId xmlns:p14="http://schemas.microsoft.com/office/powerpoint/2010/main" val="4076990827"/>
+      </p:ext>
+    </p:extLst>
+  </p:cSld>
+  <p:clrMapOvr>
+    <a:masterClrMapping/>
+  </p:clrMapOvr>
+</p:sld>
+</file>
+
+<file path=ppt/slides/slide5.xml><?xml version="1.0" encoding="utf-8"?>
+<p:sld xmlns:a="http://schemas.openxmlformats.org/drawingml/2006/main" xmlns:r="http://schemas.openxmlformats.org/officeDocument/2006/relationships" xmlns:p="http://schemas.openxmlformats.org/presentationml/2006/main">
+  <p:cSld>
+    <p:spTree>
+      <p:nvGrpSpPr>
+        <p:cNvPr id="1" name=""/>
+        <p:cNvGrpSpPr/>
+        <p:nvPr/>
+      </p:nvGrpSpPr>
+      <p:grpSpPr>
+        <a:xfrm>
+          <a:off x="0" y="0"/>
+          <a:ext cx="0" cy="0"/>
+          <a:chOff x="0" y="0"/>
+          <a:chExt cx="0" cy="0"/>
+        </a:xfrm>
+      </p:grpSpPr>
+      <p:sp>
+        <p:nvSpPr>
+          <p:cNvPr id="2" name="Title 1">
+            <a:extLst>
+              <a:ext uri="{FF2B5EF4-FFF2-40B4-BE49-F238E27FC236}">
                 <a16:creationId xmlns:a16="http://schemas.microsoft.com/office/drawing/2014/main" id="{0CF7C261-69C1-7A4A-870A-831C5230DBEF}"/>
               </a:ext>
             </a:extLst>
@@ -3430,7 +4032,10 @@
           <a:bodyPr/>
           <a:lstStyle/>
           <a:p>
-            <a:endParaRPr lang="en-US"/>
+            <a:r>
+              <a:rPr lang="en-US" dirty="0"/>
+              <a:t>Technical architecture</a:t>
+            </a:r>
           </a:p>
         </p:txBody>
       </p:sp>
@@ -3623,7 +4228,9 @@
           </a:fontRef>
         </p:style>
         <p:txBody>
-          <a:bodyPr rtlCol="0" anchor="ctr"/>
+          <a:bodyPr rtlCol="0" anchor="ctr">
+            <a:normAutofit lnSpcReduction="10000"/>
+          </a:bodyPr>
           <a:lstStyle/>
           <a:p>
             <a:pPr marL="0" indent="0" algn="ctr">
@@ -4002,6 +4609,392 @@
     <p:extLst>
       <p:ext uri="{BB962C8B-B14F-4D97-AF65-F5344CB8AC3E}">
         <p14:creationId xmlns:p14="http://schemas.microsoft.com/office/powerpoint/2010/main" val="2874691725"/>
+      </p:ext>
+    </p:extLst>
+  </p:cSld>
+  <p:clrMapOvr>
+    <a:masterClrMapping/>
+  </p:clrMapOvr>
+</p:sld>
+</file>
+
+<file path=ppt/slides/slide6.xml><?xml version="1.0" encoding="utf-8"?>
+<p:sld xmlns:a="http://schemas.openxmlformats.org/drawingml/2006/main" xmlns:r="http://schemas.openxmlformats.org/officeDocument/2006/relationships" xmlns:p="http://schemas.openxmlformats.org/presentationml/2006/main">
+  <p:cSld>
+    <p:spTree>
+      <p:nvGrpSpPr>
+        <p:cNvPr id="1" name=""/>
+        <p:cNvGrpSpPr/>
+        <p:nvPr/>
+      </p:nvGrpSpPr>
+      <p:grpSpPr>
+        <a:xfrm>
+          <a:off x="0" y="0"/>
+          <a:ext cx="0" cy="0"/>
+          <a:chOff x="0" y="0"/>
+          <a:chExt cx="0" cy="0"/>
+        </a:xfrm>
+      </p:grpSpPr>
+      <p:sp>
+        <p:nvSpPr>
+          <p:cNvPr id="2" name="Title 1">
+            <a:extLst>
+              <a:ext uri="{FF2B5EF4-FFF2-40B4-BE49-F238E27FC236}">
+                <a16:creationId xmlns:a16="http://schemas.microsoft.com/office/drawing/2014/main" id="{CB74365C-EED7-A943-A43A-A5644CD2029E}"/>
+              </a:ext>
+            </a:extLst>
+          </p:cNvPr>
+          <p:cNvSpPr>
+            <a:spLocks noGrp="1"/>
+          </p:cNvSpPr>
+          <p:nvPr>
+            <p:ph type="title"/>
+          </p:nvPr>
+        </p:nvSpPr>
+        <p:spPr/>
+        <p:txBody>
+          <a:bodyPr/>
+          <a:lstStyle/>
+          <a:p>
+            <a:r>
+              <a:rPr lang="en-US" dirty="0"/>
+              <a:t>Technical Implementations</a:t>
+            </a:r>
+          </a:p>
+        </p:txBody>
+      </p:sp>
+      <p:sp>
+        <p:nvSpPr>
+          <p:cNvPr id="3" name="Content Placeholder 2">
+            <a:extLst>
+              <a:ext uri="{FF2B5EF4-FFF2-40B4-BE49-F238E27FC236}">
+                <a16:creationId xmlns:a16="http://schemas.microsoft.com/office/drawing/2014/main" id="{82F55A53-07C8-5941-9922-B3AB42B02E9F}"/>
+              </a:ext>
+            </a:extLst>
+          </p:cNvPr>
+          <p:cNvSpPr>
+            <a:spLocks noGrp="1"/>
+          </p:cNvSpPr>
+          <p:nvPr>
+            <p:ph idx="1"/>
+          </p:nvPr>
+        </p:nvSpPr>
+        <p:spPr/>
+        <p:txBody>
+          <a:bodyPr/>
+          <a:lstStyle/>
+          <a:p>
+            <a:r>
+              <a:rPr lang="en-US" dirty="0"/>
+              <a:t>Data collection from Different sources has always been a challenge.</a:t>
+            </a:r>
+          </a:p>
+          <a:p>
+            <a:r>
+              <a:rPr lang="en-US" dirty="0"/>
+              <a:t>Comes at a price</a:t>
+            </a:r>
+          </a:p>
+          <a:p>
+            <a:r>
+              <a:rPr lang="en-US" dirty="0"/>
+              <a:t>Scrapping</a:t>
+            </a:r>
+          </a:p>
+          <a:p>
+            <a:r>
+              <a:rPr lang="en-US" dirty="0"/>
+              <a:t>Scrapping with reasonable </a:t>
+            </a:r>
+          </a:p>
+          <a:p>
+            <a:r>
+              <a:rPr lang="en-US" dirty="0"/>
+              <a:t>Data Sources </a:t>
+            </a:r>
+          </a:p>
+          <a:p>
+            <a:endParaRPr lang="en-US" dirty="0"/>
+          </a:p>
+        </p:txBody>
+      </p:sp>
+    </p:spTree>
+    <p:extLst>
+      <p:ext uri="{BB962C8B-B14F-4D97-AF65-F5344CB8AC3E}">
+        <p14:creationId xmlns:p14="http://schemas.microsoft.com/office/powerpoint/2010/main" val="3346186564"/>
+      </p:ext>
+    </p:extLst>
+  </p:cSld>
+  <p:clrMapOvr>
+    <a:masterClrMapping/>
+  </p:clrMapOvr>
+</p:sld>
+</file>
+
+<file path=ppt/slides/slide7.xml><?xml version="1.0" encoding="utf-8"?>
+<p:sld xmlns:a="http://schemas.openxmlformats.org/drawingml/2006/main" xmlns:r="http://schemas.openxmlformats.org/officeDocument/2006/relationships" xmlns:p="http://schemas.openxmlformats.org/presentationml/2006/main">
+  <p:cSld>
+    <p:spTree>
+      <p:nvGrpSpPr>
+        <p:cNvPr id="1" name=""/>
+        <p:cNvGrpSpPr/>
+        <p:nvPr/>
+      </p:nvGrpSpPr>
+      <p:grpSpPr>
+        <a:xfrm>
+          <a:off x="0" y="0"/>
+          <a:ext cx="0" cy="0"/>
+          <a:chOff x="0" y="0"/>
+          <a:chExt cx="0" cy="0"/>
+        </a:xfrm>
+      </p:grpSpPr>
+      <p:sp>
+        <p:nvSpPr>
+          <p:cNvPr id="2" name="Title 1">
+            <a:extLst>
+              <a:ext uri="{FF2B5EF4-FFF2-40B4-BE49-F238E27FC236}">
+                <a16:creationId xmlns:a16="http://schemas.microsoft.com/office/drawing/2014/main" id="{7B48B0EF-895B-AE44-A174-26B2D10B77A2}"/>
+              </a:ext>
+            </a:extLst>
+          </p:cNvPr>
+          <p:cNvSpPr>
+            <a:spLocks noGrp="1"/>
+          </p:cNvSpPr>
+          <p:nvPr>
+            <p:ph type="title"/>
+          </p:nvPr>
+        </p:nvSpPr>
+        <p:spPr/>
+        <p:txBody>
+          <a:bodyPr/>
+          <a:lstStyle/>
+          <a:p>
+            <a:r>
+              <a:rPr lang="en-US" dirty="0"/>
+              <a:t>Steps</a:t>
+            </a:r>
+          </a:p>
+        </p:txBody>
+      </p:sp>
+      <p:sp>
+        <p:nvSpPr>
+          <p:cNvPr id="3" name="Content Placeholder 2">
+            <a:extLst>
+              <a:ext uri="{FF2B5EF4-FFF2-40B4-BE49-F238E27FC236}">
+                <a16:creationId xmlns:a16="http://schemas.microsoft.com/office/drawing/2014/main" id="{6B10BEAB-4441-FB48-AC2B-C6989E07541D}"/>
+              </a:ext>
+            </a:extLst>
+          </p:cNvPr>
+          <p:cNvSpPr>
+            <a:spLocks noGrp="1"/>
+          </p:cNvSpPr>
+          <p:nvPr>
+            <p:ph idx="1"/>
+          </p:nvPr>
+        </p:nvSpPr>
+        <p:spPr/>
+        <p:txBody>
+          <a:bodyPr/>
+          <a:lstStyle/>
+          <a:p>
+            <a:r>
+              <a:rPr lang="en-US" dirty="0"/>
+              <a:t>Optimization </a:t>
+            </a:r>
+          </a:p>
+          <a:p>
+            <a:r>
+              <a:rPr lang="en-US" dirty="0"/>
+              <a:t>Data used </a:t>
+            </a:r>
+          </a:p>
+        </p:txBody>
+      </p:sp>
+    </p:spTree>
+    <p:extLst>
+      <p:ext uri="{BB962C8B-B14F-4D97-AF65-F5344CB8AC3E}">
+        <p14:creationId xmlns:p14="http://schemas.microsoft.com/office/powerpoint/2010/main" val="667315983"/>
+      </p:ext>
+    </p:extLst>
+  </p:cSld>
+  <p:clrMapOvr>
+    <a:masterClrMapping/>
+  </p:clrMapOvr>
+</p:sld>
+</file>
+
+<file path=ppt/slides/slide8.xml><?xml version="1.0" encoding="utf-8"?>
+<p:sld xmlns:a="http://schemas.openxmlformats.org/drawingml/2006/main" xmlns:r="http://schemas.openxmlformats.org/officeDocument/2006/relationships" xmlns:p="http://schemas.openxmlformats.org/presentationml/2006/main">
+  <p:cSld>
+    <p:spTree>
+      <p:nvGrpSpPr>
+        <p:cNvPr id="1" name=""/>
+        <p:cNvGrpSpPr/>
+        <p:nvPr/>
+      </p:nvGrpSpPr>
+      <p:grpSpPr>
+        <a:xfrm>
+          <a:off x="0" y="0"/>
+          <a:ext cx="0" cy="0"/>
+          <a:chOff x="0" y="0"/>
+          <a:chExt cx="0" cy="0"/>
+        </a:xfrm>
+      </p:grpSpPr>
+      <p:sp>
+        <p:nvSpPr>
+          <p:cNvPr id="2" name="Title 1">
+            <a:extLst>
+              <a:ext uri="{FF2B5EF4-FFF2-40B4-BE49-F238E27FC236}">
+                <a16:creationId xmlns:a16="http://schemas.microsoft.com/office/drawing/2014/main" id="{9FAD4929-D7C7-9E42-9BD2-B319DEE39DC4}"/>
+              </a:ext>
+            </a:extLst>
+          </p:cNvPr>
+          <p:cNvSpPr>
+            <a:spLocks noGrp="1"/>
+          </p:cNvSpPr>
+          <p:nvPr>
+            <p:ph type="title"/>
+          </p:nvPr>
+        </p:nvSpPr>
+        <p:spPr/>
+        <p:txBody>
+          <a:bodyPr/>
+          <a:lstStyle/>
+          <a:p>
+            <a:r>
+              <a:rPr lang="en-US" dirty="0"/>
+              <a:t>Technical component used</a:t>
+            </a:r>
+          </a:p>
+        </p:txBody>
+      </p:sp>
+      <p:sp>
+        <p:nvSpPr>
+          <p:cNvPr id="3" name="Content Placeholder 2">
+            <a:extLst>
+              <a:ext uri="{FF2B5EF4-FFF2-40B4-BE49-F238E27FC236}">
+                <a16:creationId xmlns:a16="http://schemas.microsoft.com/office/drawing/2014/main" id="{27DF138A-1095-3342-B215-BC5FB30A4E24}"/>
+              </a:ext>
+            </a:extLst>
+          </p:cNvPr>
+          <p:cNvSpPr>
+            <a:spLocks noGrp="1"/>
+          </p:cNvSpPr>
+          <p:nvPr>
+            <p:ph idx="1"/>
+          </p:nvPr>
+        </p:nvSpPr>
+        <p:spPr/>
+        <p:txBody>
+          <a:bodyPr/>
+          <a:lstStyle/>
+          <a:p>
+            <a:r>
+              <a:rPr lang="en-US" dirty="0"/>
+              <a:t>Data Scrappers</a:t>
+            </a:r>
+          </a:p>
+          <a:p>
+            <a:r>
+              <a:rPr lang="en-US" dirty="0"/>
+              <a:t>Backend </a:t>
+            </a:r>
+          </a:p>
+          <a:p>
+            <a:r>
+              <a:rPr lang="en-US" dirty="0"/>
+              <a:t>Data Presentation</a:t>
+            </a:r>
+          </a:p>
+        </p:txBody>
+      </p:sp>
+    </p:spTree>
+    <p:extLst>
+      <p:ext uri="{BB962C8B-B14F-4D97-AF65-F5344CB8AC3E}">
+        <p14:creationId xmlns:p14="http://schemas.microsoft.com/office/powerpoint/2010/main" val="3797107244"/>
+      </p:ext>
+    </p:extLst>
+  </p:cSld>
+  <p:clrMapOvr>
+    <a:masterClrMapping/>
+  </p:clrMapOvr>
+</p:sld>
+</file>
+
+<file path=ppt/slides/slide9.xml><?xml version="1.0" encoding="utf-8"?>
+<p:sld xmlns:a="http://schemas.openxmlformats.org/drawingml/2006/main" xmlns:r="http://schemas.openxmlformats.org/officeDocument/2006/relationships" xmlns:p="http://schemas.openxmlformats.org/presentationml/2006/main">
+  <p:cSld>
+    <p:spTree>
+      <p:nvGrpSpPr>
+        <p:cNvPr id="1" name=""/>
+        <p:cNvGrpSpPr/>
+        <p:nvPr/>
+      </p:nvGrpSpPr>
+      <p:grpSpPr>
+        <a:xfrm>
+          <a:off x="0" y="0"/>
+          <a:ext cx="0" cy="0"/>
+          <a:chOff x="0" y="0"/>
+          <a:chExt cx="0" cy="0"/>
+        </a:xfrm>
+      </p:grpSpPr>
+      <p:sp>
+        <p:nvSpPr>
+          <p:cNvPr id="2" name="Title 1">
+            <a:extLst>
+              <a:ext uri="{FF2B5EF4-FFF2-40B4-BE49-F238E27FC236}">
+                <a16:creationId xmlns:a16="http://schemas.microsoft.com/office/drawing/2014/main" id="{B4187FE7-F228-984C-9004-E5F5D4B52876}"/>
+              </a:ext>
+            </a:extLst>
+          </p:cNvPr>
+          <p:cNvSpPr>
+            <a:spLocks noGrp="1"/>
+          </p:cNvSpPr>
+          <p:nvPr>
+            <p:ph type="title"/>
+          </p:nvPr>
+        </p:nvSpPr>
+        <p:spPr/>
+        <p:txBody>
+          <a:bodyPr/>
+          <a:lstStyle/>
+          <a:p>
+            <a:r>
+              <a:rPr lang="en-US" dirty="0"/>
+              <a:t>Data Scrappers</a:t>
+            </a:r>
+          </a:p>
+        </p:txBody>
+      </p:sp>
+      <p:sp>
+        <p:nvSpPr>
+          <p:cNvPr id="3" name="Content Placeholder 2">
+            <a:extLst>
+              <a:ext uri="{FF2B5EF4-FFF2-40B4-BE49-F238E27FC236}">
+                <a16:creationId xmlns:a16="http://schemas.microsoft.com/office/drawing/2014/main" id="{97ED134D-B766-754B-874F-FED8C25230A6}"/>
+              </a:ext>
+            </a:extLst>
+          </p:cNvPr>
+          <p:cNvSpPr>
+            <a:spLocks noGrp="1"/>
+          </p:cNvSpPr>
+          <p:nvPr>
+            <p:ph idx="1"/>
+          </p:nvPr>
+        </p:nvSpPr>
+        <p:spPr/>
+        <p:txBody>
+          <a:bodyPr/>
+          <a:lstStyle/>
+          <a:p>
+            <a:endParaRPr lang="en-US" dirty="0"/>
+          </a:p>
+        </p:txBody>
+      </p:sp>
+    </p:spTree>
+    <p:extLst>
+      <p:ext uri="{BB962C8B-B14F-4D97-AF65-F5344CB8AC3E}">
+        <p14:creationId xmlns:p14="http://schemas.microsoft.com/office/powerpoint/2010/main" val="356340172"/>
       </p:ext>
     </p:extLst>
   </p:cSld>

</xml_diff>